<commit_message>
filtering by human domains results v1
</commit_message>
<xml_diff>
--- a/presentations_posters/schemas.pptx
+++ b/presentations_posters/schemas.pptx
@@ -105,6 +105,11 @@
       </a:defRPr>
     </a:lvl9pPr>
   </p:defaultTextStyle>
+  <p:extLst>
+    <p:ext uri="{EFAFB233-063F-42B5-8137-9DF3F51BA10A}">
+      <p15:sldGuideLst xmlns:p15="http://schemas.microsoft.com/office/powerpoint/2012/main"/>
+    </p:ext>
+  </p:extLst>
 </p:presentation>
 </file>
 
@@ -239,7 +244,7 @@
           <a:p>
             <a:fld id="{0AA9161A-D89C-EF43-8E7B-61C797291AA3}" type="datetimeFigureOut">
               <a:rPr lang="en-US" smtClean="0"/>
-              <a:t>5/25/18</a:t>
+              <a:t>8/15/18</a:t>
             </a:fld>
             <a:endParaRPr lang="en-US"/>
           </a:p>
@@ -409,7 +414,7 @@
           <a:p>
             <a:fld id="{0AA9161A-D89C-EF43-8E7B-61C797291AA3}" type="datetimeFigureOut">
               <a:rPr lang="en-US" smtClean="0"/>
-              <a:t>5/25/18</a:t>
+              <a:t>8/15/18</a:t>
             </a:fld>
             <a:endParaRPr lang="en-US"/>
           </a:p>
@@ -589,7 +594,7 @@
           <a:p>
             <a:fld id="{0AA9161A-D89C-EF43-8E7B-61C797291AA3}" type="datetimeFigureOut">
               <a:rPr lang="en-US" smtClean="0"/>
-              <a:t>5/25/18</a:t>
+              <a:t>8/15/18</a:t>
             </a:fld>
             <a:endParaRPr lang="en-US"/>
           </a:p>
@@ -759,7 +764,7 @@
           <a:p>
             <a:fld id="{0AA9161A-D89C-EF43-8E7B-61C797291AA3}" type="datetimeFigureOut">
               <a:rPr lang="en-US" smtClean="0"/>
-              <a:t>5/25/18</a:t>
+              <a:t>8/15/18</a:t>
             </a:fld>
             <a:endParaRPr lang="en-US"/>
           </a:p>
@@ -1003,7 +1008,7 @@
           <a:p>
             <a:fld id="{0AA9161A-D89C-EF43-8E7B-61C797291AA3}" type="datetimeFigureOut">
               <a:rPr lang="en-US" smtClean="0"/>
-              <a:t>5/25/18</a:t>
+              <a:t>8/15/18</a:t>
             </a:fld>
             <a:endParaRPr lang="en-US"/>
           </a:p>
@@ -1235,7 +1240,7 @@
           <a:p>
             <a:fld id="{0AA9161A-D89C-EF43-8E7B-61C797291AA3}" type="datetimeFigureOut">
               <a:rPr lang="en-US" smtClean="0"/>
-              <a:t>5/25/18</a:t>
+              <a:t>8/15/18</a:t>
             </a:fld>
             <a:endParaRPr lang="en-US"/>
           </a:p>
@@ -1602,7 +1607,7 @@
           <a:p>
             <a:fld id="{0AA9161A-D89C-EF43-8E7B-61C797291AA3}" type="datetimeFigureOut">
               <a:rPr lang="en-US" smtClean="0"/>
-              <a:t>5/25/18</a:t>
+              <a:t>8/15/18</a:t>
             </a:fld>
             <a:endParaRPr lang="en-US"/>
           </a:p>
@@ -1720,7 +1725,7 @@
           <a:p>
             <a:fld id="{0AA9161A-D89C-EF43-8E7B-61C797291AA3}" type="datetimeFigureOut">
               <a:rPr lang="en-US" smtClean="0"/>
-              <a:t>5/25/18</a:t>
+              <a:t>8/15/18</a:t>
             </a:fld>
             <a:endParaRPr lang="en-US"/>
           </a:p>
@@ -1815,7 +1820,7 @@
           <a:p>
             <a:fld id="{0AA9161A-D89C-EF43-8E7B-61C797291AA3}" type="datetimeFigureOut">
               <a:rPr lang="en-US" smtClean="0"/>
-              <a:t>5/25/18</a:t>
+              <a:t>8/15/18</a:t>
             </a:fld>
             <a:endParaRPr lang="en-US"/>
           </a:p>
@@ -2092,7 +2097,7 @@
           <a:p>
             <a:fld id="{0AA9161A-D89C-EF43-8E7B-61C797291AA3}" type="datetimeFigureOut">
               <a:rPr lang="en-US" smtClean="0"/>
-              <a:t>5/25/18</a:t>
+              <a:t>8/15/18</a:t>
             </a:fld>
             <a:endParaRPr lang="en-US"/>
           </a:p>
@@ -2349,7 +2354,7 @@
           <a:p>
             <a:fld id="{0AA9161A-D89C-EF43-8E7B-61C797291AA3}" type="datetimeFigureOut">
               <a:rPr lang="en-US" smtClean="0"/>
-              <a:t>5/25/18</a:t>
+              <a:t>8/15/18</a:t>
             </a:fld>
             <a:endParaRPr lang="en-US"/>
           </a:p>
@@ -2562,7 +2567,7 @@
           <a:p>
             <a:fld id="{0AA9161A-D89C-EF43-8E7B-61C797291AA3}" type="datetimeFigureOut">
               <a:rPr lang="en-US" smtClean="0"/>
-              <a:t>5/25/18</a:t>
+              <a:t>8/15/18</a:t>
             </a:fld>
             <a:endParaRPr lang="en-US"/>
           </a:p>
@@ -4715,6 +4720,16 @@
           <a:p>
             <a:pPr algn="ctr"/>
             <a:r>
+              <a:rPr lang="en-US" sz="2800">
+                <a:solidFill>
+                  <a:schemeClr val="tx1"/>
+                </a:solidFill>
+                <a:latin typeface="Times New Roman" panose="02020603050405020304" pitchFamily="18" charset="0"/>
+                <a:cs typeface="Times New Roman" panose="02020603050405020304" pitchFamily="18" charset="0"/>
+              </a:rPr>
+              <a:t>Find </a:t>
+            </a:r>
+            <a:r>
               <a:rPr lang="en-US" sz="2800" dirty="0">
                 <a:solidFill>
                   <a:schemeClr val="tx1"/>
@@ -4722,7 +4737,7 @@
                 <a:latin typeface="Times New Roman" panose="02020603050405020304" pitchFamily="18" charset="0"/>
                 <a:cs typeface="Times New Roman" panose="02020603050405020304" pitchFamily="18" charset="0"/>
               </a:rPr>
-              <a:t>Estimate enriched domains</a:t>
+              <a:t>enriched domains</a:t>
             </a:r>
           </a:p>
         </p:txBody>

</xml_diff>